<commit_message>
Replace DS project - Group 10.pptx
</commit_message>
<xml_diff>
--- a/presentation/DS project - Group 10.pptx
+++ b/presentation/DS project - Group 10.pptx
@@ -5,7 +5,7 @@
     <p:sldMasterId id="2147483690" r:id="rId1"/>
   </p:sldMasterIdLst>
   <p:notesMasterIdLst>
-    <p:notesMasterId r:id="rId13"/>
+    <p:notesMasterId r:id="rId12"/>
   </p:notesMasterIdLst>
   <p:sldIdLst>
     <p:sldId id="256" r:id="rId2"/>
@@ -15,10 +15,9 @@
     <p:sldId id="267" r:id="rId6"/>
     <p:sldId id="264" r:id="rId7"/>
     <p:sldId id="265" r:id="rId8"/>
-    <p:sldId id="266" r:id="rId9"/>
-    <p:sldId id="260" r:id="rId10"/>
-    <p:sldId id="261" r:id="rId11"/>
-    <p:sldId id="262" r:id="rId12"/>
+    <p:sldId id="260" r:id="rId9"/>
+    <p:sldId id="261" r:id="rId10"/>
+    <p:sldId id="262" r:id="rId11"/>
   </p:sldIdLst>
   <p:sldSz cx="12192000" cy="6858000"/>
   <p:notesSz cx="6858000" cy="9144000"/>
@@ -398,7 +397,7 @@
           <a:p>
             <a:fld id="{3A84E536-10AD-D347-952D-FF72D8DF94C6}" type="datetimeFigureOut">
               <a:rPr lang="en-US" smtClean="0"/>
-              <a:t>12/9/24</a:t>
+              <a:t>12/10/2024</a:t>
             </a:fld>
             <a:endParaRPr lang="en-US"/>
           </a:p>
@@ -1960,101 +1959,6 @@
           <a:p>
             <a:r>
               <a:rPr lang="en-US" dirty="0"/>
-              <a:t>Age and ejection fraction are the most important predictors across all models, with high contributions. </a:t>
-            </a:r>
-            <a:r>
-              <a:rPr lang="en-US" dirty="0" err="1"/>
-              <a:t>Anaemia</a:t>
-            </a:r>
-            <a:r>
-              <a:rPr lang="en-US" dirty="0"/>
-              <a:t> and high blood pressure have moderate importance, while diabetes has minimal impact on predictions.</a:t>
-            </a:r>
-          </a:p>
-        </p:txBody>
-      </p:sp>
-      <p:sp>
-        <p:nvSpPr>
-          <p:cNvPr id="4" name="Slide Number Placeholder 3"/>
-          <p:cNvSpPr>
-            <a:spLocks noGrp="1"/>
-          </p:cNvSpPr>
-          <p:nvPr>
-            <p:ph type="sldNum" sz="quarter" idx="5"/>
-          </p:nvPr>
-        </p:nvSpPr>
-        <p:spPr/>
-        <p:txBody>
-          <a:bodyPr/>
-          <a:lstStyle/>
-          <a:p>
-            <a:fld id="{CC709C84-9087-EE45-A947-8DEA084ED9CA}" type="slidenum">
-              <a:rPr lang="en-US" smtClean="0"/>
-              <a:t>8</a:t>
-            </a:fld>
-            <a:endParaRPr lang="en-US"/>
-          </a:p>
-        </p:txBody>
-      </p:sp>
-    </p:spTree>
-    <p:extLst>
-      <p:ext uri="{BB962C8B-B14F-4D97-AF65-F5344CB8AC3E}">
-        <p14:creationId xmlns:p14="http://schemas.microsoft.com/office/powerpoint/2010/main" val="2438779635"/>
-      </p:ext>
-    </p:extLst>
-  </p:cSld>
-  <p:clrMapOvr>
-    <a:masterClrMapping/>
-  </p:clrMapOvr>
-</p:notes>
-</file>
-
-<file path=ppt/notesSlides/notesSlide8.xml><?xml version="1.0" encoding="utf-8"?>
-<p:notes xmlns:a="http://schemas.openxmlformats.org/drawingml/2006/main" xmlns:r="http://schemas.openxmlformats.org/officeDocument/2006/relationships" xmlns:p="http://schemas.openxmlformats.org/presentationml/2006/main">
-  <p:cSld>
-    <p:spTree>
-      <p:nvGrpSpPr>
-        <p:cNvPr id="1" name=""/>
-        <p:cNvGrpSpPr/>
-        <p:nvPr/>
-      </p:nvGrpSpPr>
-      <p:grpSpPr>
-        <a:xfrm>
-          <a:off x="0" y="0"/>
-          <a:ext cx="0" cy="0"/>
-          <a:chOff x="0" y="0"/>
-          <a:chExt cx="0" cy="0"/>
-        </a:xfrm>
-      </p:grpSpPr>
-      <p:sp>
-        <p:nvSpPr>
-          <p:cNvPr id="2" name="Slide Image Placeholder 1"/>
-          <p:cNvSpPr>
-            <a:spLocks noGrp="1" noRot="1" noChangeAspect="1"/>
-          </p:cNvSpPr>
-          <p:nvPr>
-            <p:ph type="sldImg"/>
-          </p:nvPr>
-        </p:nvSpPr>
-        <p:spPr/>
-      </p:sp>
-      <p:sp>
-        <p:nvSpPr>
-          <p:cNvPr id="3" name="Notes Placeholder 2"/>
-          <p:cNvSpPr>
-            <a:spLocks noGrp="1"/>
-          </p:cNvSpPr>
-          <p:nvPr>
-            <p:ph type="body" idx="1"/>
-          </p:nvPr>
-        </p:nvSpPr>
-        <p:spPr/>
-        <p:txBody>
-          <a:bodyPr/>
-          <a:lstStyle/>
-          <a:p>
-            <a:r>
-              <a:rPr lang="en-US" dirty="0"/>
               <a:t>This graph compares feature importance (coefficient magnitudes) across Linear, Lasso, Ridge, and ElasticNet regression models. Here's the explanation:</a:t>
             </a:r>
           </a:p>
@@ -2198,7 +2102,7 @@
           <a:p>
             <a:fld id="{CC709C84-9087-EE45-A947-8DEA084ED9CA}" type="slidenum">
               <a:rPr lang="en-US" smtClean="0"/>
-              <a:t>11</a:t>
+              <a:t>10</a:t>
             </a:fld>
             <a:endParaRPr lang="en-US"/>
           </a:p>
@@ -2443,7 +2347,7 @@
           <a:p>
             <a:fld id="{52D777AD-9BA8-4D67-B65E-B9CD78F9AFB0}" type="datetimeFigureOut">
               <a:rPr lang="en-US" smtClean="0"/>
-              <a:t>12/9/24</a:t>
+              <a:t>12/10/2024</a:t>
             </a:fld>
             <a:endParaRPr lang="en-US"/>
           </a:p>
@@ -2651,7 +2555,7 @@
           <a:p>
             <a:fld id="{52D777AD-9BA8-4D67-B65E-B9CD78F9AFB0}" type="datetimeFigureOut">
               <a:rPr lang="en-US" smtClean="0"/>
-              <a:t>12/9/24</a:t>
+              <a:t>12/10/2024</a:t>
             </a:fld>
             <a:endParaRPr lang="en-US"/>
           </a:p>
@@ -2907,7 +2811,7 @@
           <a:p>
             <a:fld id="{52D777AD-9BA8-4D67-B65E-B9CD78F9AFB0}" type="datetimeFigureOut">
               <a:rPr lang="en-US" smtClean="0"/>
-              <a:t>12/9/24</a:t>
+              <a:t>12/10/2024</a:t>
             </a:fld>
             <a:endParaRPr lang="en-US"/>
           </a:p>
@@ -3081,7 +2985,7 @@
           <a:p>
             <a:fld id="{52D777AD-9BA8-4D67-B65E-B9CD78F9AFB0}" type="datetimeFigureOut">
               <a:rPr lang="en-US" smtClean="0"/>
-              <a:t>12/9/24</a:t>
+              <a:t>12/10/2024</a:t>
             </a:fld>
             <a:endParaRPr lang="en-US"/>
           </a:p>
@@ -3424,7 +3328,7 @@
           <a:p>
             <a:fld id="{52D777AD-9BA8-4D67-B65E-B9CD78F9AFB0}" type="datetimeFigureOut">
               <a:rPr lang="en-US" smtClean="0"/>
-              <a:t>12/9/24</a:t>
+              <a:t>12/10/2024</a:t>
             </a:fld>
             <a:endParaRPr lang="en-US"/>
           </a:p>
@@ -3699,7 +3603,7 @@
           <a:p>
             <a:fld id="{52D777AD-9BA8-4D67-B65E-B9CD78F9AFB0}" type="datetimeFigureOut">
               <a:rPr lang="en-US" smtClean="0"/>
-              <a:t>12/9/24</a:t>
+              <a:t>12/10/2024</a:t>
             </a:fld>
             <a:endParaRPr lang="en-US"/>
           </a:p>
@@ -4078,7 +3982,7 @@
           <a:p>
             <a:fld id="{52D777AD-9BA8-4D67-B65E-B9CD78F9AFB0}" type="datetimeFigureOut">
               <a:rPr lang="en-US" smtClean="0"/>
-              <a:t>12/9/24</a:t>
+              <a:t>12/10/2024</a:t>
             </a:fld>
             <a:endParaRPr lang="en-US"/>
           </a:p>
@@ -4196,7 +4100,7 @@
           <a:p>
             <a:fld id="{52D777AD-9BA8-4D67-B65E-B9CD78F9AFB0}" type="datetimeFigureOut">
               <a:rPr lang="en-US" smtClean="0"/>
-              <a:t>12/9/24</a:t>
+              <a:t>12/10/2024</a:t>
             </a:fld>
             <a:endParaRPr lang="en-US"/>
           </a:p>
@@ -4367,7 +4271,7 @@
           <a:p>
             <a:fld id="{52D777AD-9BA8-4D67-B65E-B9CD78F9AFB0}" type="datetimeFigureOut">
               <a:rPr lang="en-US" smtClean="0"/>
-              <a:t>12/9/24</a:t>
+              <a:t>12/10/2024</a:t>
             </a:fld>
             <a:endParaRPr lang="en-US"/>
           </a:p>
@@ -4721,7 +4625,7 @@
           <a:p>
             <a:fld id="{52D777AD-9BA8-4D67-B65E-B9CD78F9AFB0}" type="datetimeFigureOut">
               <a:rPr lang="en-US" smtClean="0"/>
-              <a:t>12/9/24</a:t>
+              <a:t>12/10/2024</a:t>
             </a:fld>
             <a:endParaRPr lang="en-US"/>
           </a:p>
@@ -5103,7 +5007,7 @@
           <a:p>
             <a:fld id="{52D777AD-9BA8-4D67-B65E-B9CD78F9AFB0}" type="datetimeFigureOut">
               <a:rPr lang="en-US" smtClean="0"/>
-              <a:t>12/9/24</a:t>
+              <a:t>12/10/2024</a:t>
             </a:fld>
             <a:endParaRPr lang="en-US"/>
           </a:p>
@@ -5390,7 +5294,7 @@
           <a:p>
             <a:fld id="{52D777AD-9BA8-4D67-B65E-B9CD78F9AFB0}" type="datetimeFigureOut">
               <a:rPr lang="en-US" smtClean="0"/>
-              <a:t>12/9/24</a:t>
+              <a:t>12/10/2024</a:t>
             </a:fld>
             <a:endParaRPr lang="en-US"/>
           </a:p>
@@ -6021,118 +5925,6 @@
           <p:cNvPr id="2" name="Title 1">
             <a:extLst>
               <a:ext uri="{FF2B5EF4-FFF2-40B4-BE49-F238E27FC236}">
-                <a16:creationId xmlns:a16="http://schemas.microsoft.com/office/drawing/2014/main" id="{72F79049-446A-6EBB-4477-31089B2552D4}"/>
-              </a:ext>
-            </a:extLst>
-          </p:cNvPr>
-          <p:cNvSpPr>
-            <a:spLocks noGrp="1"/>
-          </p:cNvSpPr>
-          <p:nvPr>
-            <p:ph type="title"/>
-          </p:nvPr>
-        </p:nvSpPr>
-        <p:spPr/>
-        <p:txBody>
-          <a:bodyPr/>
-          <a:lstStyle/>
-          <a:p>
-            <a:r>
-              <a:rPr lang="en-US" dirty="0"/>
-              <a:t>Discussion:</a:t>
-            </a:r>
-          </a:p>
-        </p:txBody>
-      </p:sp>
-      <p:sp>
-        <p:nvSpPr>
-          <p:cNvPr id="3" name="Content Placeholder 2">
-            <a:extLst>
-              <a:ext uri="{FF2B5EF4-FFF2-40B4-BE49-F238E27FC236}">
-                <a16:creationId xmlns:a16="http://schemas.microsoft.com/office/drawing/2014/main" id="{6A744435-417A-06B3-A245-2D1D46C5AAEF}"/>
-              </a:ext>
-            </a:extLst>
-          </p:cNvPr>
-          <p:cNvSpPr>
-            <a:spLocks noGrp="1"/>
-          </p:cNvSpPr>
-          <p:nvPr>
-            <p:ph idx="1"/>
-          </p:nvPr>
-        </p:nvSpPr>
-        <p:spPr/>
-        <p:txBody>
-          <a:bodyPr/>
-          <a:lstStyle/>
-          <a:p>
-            <a:pPr>
-              <a:buFont typeface="Arial" panose="020B0604020202020204" pitchFamily="34" charset="0"/>
-              <a:buChar char="•"/>
-            </a:pPr>
-            <a:r>
-              <a:rPr lang="en-US" dirty="0"/>
-              <a:t> If generalized, results imply that focusing on key predictors like serum creatinine and ejection fraction can guide early detection and interventions.</a:t>
-            </a:r>
-          </a:p>
-          <a:p>
-            <a:pPr marL="0" indent="0">
-              <a:buNone/>
-            </a:pPr>
-            <a:endParaRPr lang="en-US" b="1" dirty="0"/>
-          </a:p>
-          <a:p>
-            <a:pPr marL="0" indent="0">
-              <a:buNone/>
-            </a:pPr>
-            <a:r>
-              <a:rPr lang="en-US" b="1" dirty="0"/>
-              <a:t>Limitations: </a:t>
-            </a:r>
-            <a:r>
-              <a:rPr lang="en-US" dirty="0"/>
-              <a:t>Confounding variables and dataset scope require further validation.</a:t>
-            </a:r>
-          </a:p>
-          <a:p>
-            <a:endParaRPr lang="en-US" dirty="0"/>
-          </a:p>
-        </p:txBody>
-      </p:sp>
-    </p:spTree>
-    <p:extLst>
-      <p:ext uri="{BB962C8B-B14F-4D97-AF65-F5344CB8AC3E}">
-        <p14:creationId xmlns:p14="http://schemas.microsoft.com/office/powerpoint/2010/main" val="164866002"/>
-      </p:ext>
-    </p:extLst>
-  </p:cSld>
-  <p:clrMapOvr>
-    <a:masterClrMapping/>
-  </p:clrMapOvr>
-</p:sld>
-</file>
-
-<file path=ppt/slides/slide11.xml><?xml version="1.0" encoding="utf-8"?>
-<p:sld xmlns:a="http://schemas.openxmlformats.org/drawingml/2006/main" xmlns:r="http://schemas.openxmlformats.org/officeDocument/2006/relationships" xmlns:p="http://schemas.openxmlformats.org/presentationml/2006/main">
-  <p:cSld>
-    <p:spTree>
-      <p:nvGrpSpPr>
-        <p:cNvPr id="1" name=""/>
-        <p:cNvGrpSpPr/>
-        <p:nvPr/>
-      </p:nvGrpSpPr>
-      <p:grpSpPr>
-        <a:xfrm>
-          <a:off x="0" y="0"/>
-          <a:ext cx="0" cy="0"/>
-          <a:chOff x="0" y="0"/>
-          <a:chExt cx="0" cy="0"/>
-        </a:xfrm>
-      </p:grpSpPr>
-      <p:sp>
-        <p:nvSpPr>
-          <p:cNvPr id="2" name="Title 1">
-            <a:extLst>
-              <a:ext uri="{FF2B5EF4-FFF2-40B4-BE49-F238E27FC236}">
                 <a16:creationId xmlns:a16="http://schemas.microsoft.com/office/drawing/2014/main" id="{98089B58-206F-FFE9-06AC-556CE7B04929}"/>
               </a:ext>
             </a:extLst>
@@ -6186,31 +5978,49 @@
       </p:sp>
       <p:pic>
         <p:nvPicPr>
-          <p:cNvPr id="5" name="Picture 4">
+          <p:cNvPr id="4098" name="Picture 2">
             <a:extLst>
               <a:ext uri="{FF2B5EF4-FFF2-40B4-BE49-F238E27FC236}">
-                <a16:creationId xmlns:a16="http://schemas.microsoft.com/office/drawing/2014/main" id="{C8797405-EB4D-0F9D-2FC7-9F15B07E2523}"/>
+                <a16:creationId xmlns:a16="http://schemas.microsoft.com/office/drawing/2014/main" id="{63C88D2D-4BCD-2A1E-7201-A702E729CD9E}"/>
               </a:ext>
             </a:extLst>
           </p:cNvPr>
           <p:cNvPicPr>
-            <a:picLocks noChangeAspect="1"/>
+            <a:picLocks noChangeAspect="1" noChangeArrowheads="1"/>
           </p:cNvPicPr>
           <p:nvPr/>
         </p:nvPicPr>
         <p:blipFill>
-          <a:blip r:embed="rId3"/>
-          <a:srcRect l="1172" t="1762"/>
-          <a:stretch/>
+          <a:blip r:embed="rId3">
+            <a:extLst>
+              <a:ext uri="{28A0092B-C50C-407E-A947-70E740481C1C}">
+                <a14:useLocalDpi xmlns:a14="http://schemas.microsoft.com/office/drawing/2010/main" val="0"/>
+              </a:ext>
+            </a:extLst>
+          </a:blip>
+          <a:srcRect/>
+          <a:stretch>
+            <a:fillRect/>
+          </a:stretch>
         </p:blipFill>
-        <p:spPr>
+        <p:spPr bwMode="auto">
           <a:xfrm>
-            <a:off x="2632667" y="2395675"/>
-            <a:ext cx="6684405" cy="3693626"/>
+            <a:off x="2835838" y="2336028"/>
+            <a:ext cx="6520323" cy="3888309"/>
           </a:xfrm>
           <a:prstGeom prst="rect">
             <a:avLst/>
           </a:prstGeom>
+          <a:noFill/>
+          <a:extLst>
+            <a:ext uri="{909E8E84-426E-40DD-AFC4-6F175D3DCCD1}">
+              <a14:hiddenFill xmlns:a14="http://schemas.microsoft.com/office/drawing/2010/main">
+                <a:solidFill>
+                  <a:srgbClr val="FFFFFF"/>
+                </a:solidFill>
+              </a14:hiddenFill>
+            </a:ext>
+          </a:extLst>
         </p:spPr>
       </p:pic>
     </p:spTree>
@@ -6691,64 +6501,98 @@
       </p:sp>
       <p:pic>
         <p:nvPicPr>
-          <p:cNvPr id="4" name="Content Placeholder 3">
+          <p:cNvPr id="1026" name="Picture 2">
             <a:extLst>
               <a:ext uri="{FF2B5EF4-FFF2-40B4-BE49-F238E27FC236}">
-                <a16:creationId xmlns:a16="http://schemas.microsoft.com/office/drawing/2014/main" id="{068C6F33-A06E-A38D-53A3-D8AE0C0F5DB8}"/>
+                <a16:creationId xmlns:a16="http://schemas.microsoft.com/office/drawing/2014/main" id="{A2CC44F4-8B82-691A-132C-6EAE5D6C5D2B}"/>
               </a:ext>
             </a:extLst>
           </p:cNvPr>
           <p:cNvPicPr>
-            <a:picLocks noGrp="1" noChangeAspect="1"/>
+            <a:picLocks noGrp="1" noChangeAspect="1" noChangeArrowheads="1"/>
           </p:cNvPicPr>
           <p:nvPr>
             <p:ph idx="1"/>
           </p:nvPr>
         </p:nvPicPr>
         <p:blipFill>
-          <a:blip r:embed="rId3"/>
+          <a:blip r:embed="rId3">
+            <a:extLst>
+              <a:ext uri="{28A0092B-C50C-407E-A947-70E740481C1C}">
+                <a14:useLocalDpi xmlns:a14="http://schemas.microsoft.com/office/drawing/2010/main" val="0"/>
+              </a:ext>
+            </a:extLst>
+          </a:blip>
+          <a:srcRect/>
           <a:stretch>
             <a:fillRect/>
           </a:stretch>
         </p:blipFill>
-        <p:spPr>
+        <p:spPr bwMode="auto">
           <a:xfrm>
-            <a:off x="1544780" y="2096779"/>
-            <a:ext cx="4686300" cy="3467100"/>
+            <a:off x="788353" y="1958557"/>
+            <a:ext cx="5067015" cy="4022725"/>
           </a:xfrm>
           <a:prstGeom prst="rect">
             <a:avLst/>
           </a:prstGeom>
+          <a:noFill/>
+          <a:extLst>
+            <a:ext uri="{909E8E84-426E-40DD-AFC4-6F175D3DCCD1}">
+              <a14:hiddenFill xmlns:a14="http://schemas.microsoft.com/office/drawing/2010/main">
+                <a:solidFill>
+                  <a:srgbClr val="FFFFFF"/>
+                </a:solidFill>
+              </a14:hiddenFill>
+            </a:ext>
+          </a:extLst>
         </p:spPr>
       </p:pic>
       <p:pic>
         <p:nvPicPr>
-          <p:cNvPr id="5" name="Picture 4">
+          <p:cNvPr id="1028" name="Picture 4">
             <a:extLst>
               <a:ext uri="{FF2B5EF4-FFF2-40B4-BE49-F238E27FC236}">
-                <a16:creationId xmlns:a16="http://schemas.microsoft.com/office/drawing/2014/main" id="{AE959706-0360-A706-BC03-2C3FC4C4A211}"/>
+                <a16:creationId xmlns:a16="http://schemas.microsoft.com/office/drawing/2014/main" id="{2D4DC3B6-36D9-9365-89DC-B5BFE82304ED}"/>
               </a:ext>
             </a:extLst>
           </p:cNvPr>
           <p:cNvPicPr>
-            <a:picLocks noChangeAspect="1"/>
+            <a:picLocks noChangeAspect="1" noChangeArrowheads="1"/>
           </p:cNvPicPr>
           <p:nvPr/>
         </p:nvPicPr>
         <p:blipFill>
-          <a:blip r:embed="rId4"/>
+          <a:blip r:embed="rId4">
+            <a:extLst>
+              <a:ext uri="{28A0092B-C50C-407E-A947-70E740481C1C}">
+                <a14:useLocalDpi xmlns:a14="http://schemas.microsoft.com/office/drawing/2010/main" val="0"/>
+              </a:ext>
+            </a:extLst>
+          </a:blip>
+          <a:srcRect/>
           <a:stretch>
             <a:fillRect/>
           </a:stretch>
         </p:blipFill>
-        <p:spPr>
+        <p:spPr bwMode="auto">
           <a:xfrm>
-            <a:off x="6359572" y="2096779"/>
-            <a:ext cx="4686300" cy="3467100"/>
+            <a:off x="6336634" y="1958557"/>
+            <a:ext cx="5197640" cy="4077063"/>
           </a:xfrm>
           <a:prstGeom prst="rect">
             <a:avLst/>
           </a:prstGeom>
+          <a:noFill/>
+          <a:extLst>
+            <a:ext uri="{909E8E84-426E-40DD-AFC4-6F175D3DCCD1}">
+              <a14:hiddenFill xmlns:a14="http://schemas.microsoft.com/office/drawing/2010/main">
+                <a:solidFill>
+                  <a:srgbClr val="FFFFFF"/>
+                </a:solidFill>
+              </a14:hiddenFill>
+            </a:ext>
+          </a:extLst>
         </p:spPr>
       </p:pic>
     </p:spTree>
@@ -6811,34 +6655,49 @@
       </p:sp>
       <p:pic>
         <p:nvPicPr>
-          <p:cNvPr id="4" name="Content Placeholder 3">
+          <p:cNvPr id="2052" name="Picture 4">
             <a:extLst>
               <a:ext uri="{FF2B5EF4-FFF2-40B4-BE49-F238E27FC236}">
-                <a16:creationId xmlns:a16="http://schemas.microsoft.com/office/drawing/2014/main" id="{3646CEB3-56FC-A12F-24D7-E6318560B543}"/>
+                <a16:creationId xmlns:a16="http://schemas.microsoft.com/office/drawing/2014/main" id="{305D6E12-B425-C607-0B1B-C7C5211F0435}"/>
               </a:ext>
             </a:extLst>
           </p:cNvPr>
           <p:cNvPicPr>
-            <a:picLocks noGrp="1" noChangeAspect="1"/>
+            <a:picLocks noChangeAspect="1" noChangeArrowheads="1"/>
           </p:cNvPicPr>
-          <p:nvPr>
-            <p:ph idx="1"/>
-          </p:nvPr>
+          <p:nvPr/>
         </p:nvPicPr>
         <p:blipFill>
-          <a:blip r:embed="rId3"/>
+          <a:blip r:embed="rId3">
+            <a:extLst>
+              <a:ext uri="{28A0092B-C50C-407E-A947-70E740481C1C}">
+                <a14:useLocalDpi xmlns:a14="http://schemas.microsoft.com/office/drawing/2010/main" val="0"/>
+              </a:ext>
+            </a:extLst>
+          </a:blip>
+          <a:srcRect/>
           <a:stretch>
             <a:fillRect/>
           </a:stretch>
         </p:blipFill>
-        <p:spPr>
+        <p:spPr bwMode="auto">
           <a:xfrm>
-            <a:off x="3268663" y="2124075"/>
-            <a:ext cx="5715000" cy="3467100"/>
+            <a:off x="3246194" y="2074175"/>
+            <a:ext cx="5760572" cy="3557406"/>
           </a:xfrm>
           <a:prstGeom prst="rect">
             <a:avLst/>
           </a:prstGeom>
+          <a:noFill/>
+          <a:extLst>
+            <a:ext uri="{909E8E84-426E-40DD-AFC4-6F175D3DCCD1}">
+              <a14:hiddenFill xmlns:a14="http://schemas.microsoft.com/office/drawing/2010/main">
+                <a:solidFill>
+                  <a:srgbClr val="FFFFFF"/>
+                </a:solidFill>
+              </a14:hiddenFill>
+            </a:ext>
+          </a:extLst>
         </p:spPr>
       </p:pic>
     </p:spTree>
@@ -6901,34 +6760,51 @@
       </p:sp>
       <p:pic>
         <p:nvPicPr>
-          <p:cNvPr id="7" name="Content Placeholder 6">
+          <p:cNvPr id="3074" name="Picture 2">
             <a:extLst>
               <a:ext uri="{FF2B5EF4-FFF2-40B4-BE49-F238E27FC236}">
-                <a16:creationId xmlns:a16="http://schemas.microsoft.com/office/drawing/2014/main" id="{A6899DAD-C189-4EA1-FC88-1F6AFCA978DC}"/>
+                <a16:creationId xmlns:a16="http://schemas.microsoft.com/office/drawing/2014/main" id="{373F1CB2-BD7A-7F2D-3D14-E2457EFFDED5}"/>
               </a:ext>
             </a:extLst>
           </p:cNvPr>
           <p:cNvPicPr>
-            <a:picLocks noGrp="1" noChangeAspect="1"/>
+            <a:picLocks noGrp="1" noChangeAspect="1" noChangeArrowheads="1"/>
           </p:cNvPicPr>
           <p:nvPr>
             <p:ph idx="1"/>
           </p:nvPr>
         </p:nvPicPr>
         <p:blipFill>
-          <a:blip r:embed="rId3"/>
+          <a:blip r:embed="rId3">
+            <a:extLst>
+              <a:ext uri="{28A0092B-C50C-407E-A947-70E740481C1C}">
+                <a14:useLocalDpi xmlns:a14="http://schemas.microsoft.com/office/drawing/2010/main" val="0"/>
+              </a:ext>
+            </a:extLst>
+          </a:blip>
+          <a:srcRect/>
           <a:stretch>
             <a:fillRect/>
           </a:stretch>
         </p:blipFill>
-        <p:spPr>
+        <p:spPr bwMode="auto">
           <a:xfrm>
-            <a:off x="3954213" y="1846263"/>
-            <a:ext cx="4343900" cy="4022725"/>
+            <a:off x="3507775" y="2005263"/>
+            <a:ext cx="5176450" cy="3863725"/>
           </a:xfrm>
           <a:prstGeom prst="rect">
             <a:avLst/>
           </a:prstGeom>
+          <a:noFill/>
+          <a:extLst>
+            <a:ext uri="{909E8E84-426E-40DD-AFC4-6F175D3DCCD1}">
+              <a14:hiddenFill xmlns:a14="http://schemas.microsoft.com/office/drawing/2010/main">
+                <a:solidFill>
+                  <a:srgbClr val="FFFFFF"/>
+                </a:solidFill>
+              </a14:hiddenFill>
+            </a:ext>
+          </a:extLst>
         </p:spPr>
       </p:pic>
     </p:spTree>
@@ -6966,7 +6842,7 @@
           <p:cNvPr id="2" name="Title 1">
             <a:extLst>
               <a:ext uri="{FF2B5EF4-FFF2-40B4-BE49-F238E27FC236}">
-                <a16:creationId xmlns:a16="http://schemas.microsoft.com/office/drawing/2014/main" id="{51AC9F3D-68E2-6E89-ADAD-D453A2FC9C0E}"/>
+                <a16:creationId xmlns:a16="http://schemas.microsoft.com/office/drawing/2014/main" id="{E0F3ADAD-4701-DD96-C758-CF08C6722303}"/>
               </a:ext>
             </a:extLst>
           </p:cNvPr>
@@ -6984,47 +6860,100 @@
           <a:p>
             <a:r>
               <a:rPr lang="en-US" dirty="0"/>
-              <a:t>Which is the important feature?</a:t>
-            </a:r>
-          </a:p>
-        </p:txBody>
-      </p:sp>
-      <p:pic>
-        <p:nvPicPr>
-          <p:cNvPr id="4" name="Content Placeholder 3">
+              <a:t>Key Results</a:t>
+            </a:r>
+          </a:p>
+        </p:txBody>
+      </p:sp>
+      <p:sp>
+        <p:nvSpPr>
+          <p:cNvPr id="3" name="Content Placeholder 2">
             <a:extLst>
               <a:ext uri="{FF2B5EF4-FFF2-40B4-BE49-F238E27FC236}">
-                <a16:creationId xmlns:a16="http://schemas.microsoft.com/office/drawing/2014/main" id="{83DDCB75-DCA4-2BD4-EFB7-C19715CA7848}"/>
+                <a16:creationId xmlns:a16="http://schemas.microsoft.com/office/drawing/2014/main" id="{1E5FF86C-D064-4938-5492-849FA44099E1}"/>
               </a:ext>
             </a:extLst>
           </p:cNvPr>
-          <p:cNvPicPr>
-            <a:picLocks noGrp="1" noChangeAspect="1"/>
-          </p:cNvPicPr>
+          <p:cNvSpPr>
+            <a:spLocks noGrp="1"/>
+          </p:cNvSpPr>
           <p:nvPr>
             <p:ph idx="1"/>
           </p:nvPr>
-        </p:nvPicPr>
-        <p:blipFill>
-          <a:blip r:embed="rId3"/>
-          <a:stretch>
-            <a:fillRect/>
-          </a:stretch>
-        </p:blipFill>
-        <p:spPr>
-          <a:xfrm>
-            <a:off x="2781554" y="1846263"/>
-            <a:ext cx="6689217" cy="4022725"/>
-          </a:xfrm>
-          <a:prstGeom prst="rect">
-            <a:avLst/>
-          </a:prstGeom>
-        </p:spPr>
-      </p:pic>
+        </p:nvSpPr>
+        <p:spPr/>
+        <p:txBody>
+          <a:bodyPr/>
+          <a:lstStyle/>
+          <a:p>
+            <a:pPr>
+              <a:buFont typeface="+mj-lt"/>
+              <a:buAutoNum type="arabicPeriod"/>
+            </a:pPr>
+            <a:r>
+              <a:rPr lang="en-US" b="1" dirty="0"/>
+              <a:t>Predictors of Heart Failure:</a:t>
+            </a:r>
+            <a:endParaRPr lang="en-US" dirty="0"/>
+          </a:p>
+          <a:p>
+            <a:pPr marL="457200" lvl="1" indent="0">
+              <a:buNone/>
+            </a:pPr>
+            <a:r>
+              <a:rPr lang="en-US" dirty="0"/>
+              <a:t>Serum creatinine, ejection fraction, and follow-up time are critical.</a:t>
+            </a:r>
+          </a:p>
+          <a:p>
+            <a:pPr>
+              <a:buFont typeface="+mj-lt"/>
+              <a:buAutoNum type="arabicPeriod"/>
+            </a:pPr>
+            <a:r>
+              <a:rPr lang="en-US" b="1" dirty="0"/>
+              <a:t>Clustering Insights:</a:t>
+            </a:r>
+            <a:endParaRPr lang="en-US" dirty="0"/>
+          </a:p>
+          <a:p>
+            <a:pPr marL="457200" lvl="1" indent="0">
+              <a:buNone/>
+            </a:pPr>
+            <a:r>
+              <a:rPr lang="en-US" dirty="0"/>
+              <a:t>KMeans revealed distinct patient clusters, while DBSCAN identified outliers.</a:t>
+            </a:r>
+          </a:p>
+          <a:p>
+            <a:pPr>
+              <a:buFont typeface="+mj-lt"/>
+              <a:buAutoNum type="arabicPeriod"/>
+            </a:pPr>
+            <a:r>
+              <a:rPr lang="en-US" b="1" dirty="0"/>
+              <a:t>Visualization Highlights:</a:t>
+            </a:r>
+            <a:endParaRPr lang="en-US" dirty="0"/>
+          </a:p>
+          <a:p>
+            <a:pPr marL="457200" lvl="1" indent="0">
+              <a:buNone/>
+            </a:pPr>
+            <a:r>
+              <a:rPr lang="en-US" dirty="0"/>
+              <a:t>Age, smoking, and diabetes showed varying impacts on outcomes.</a:t>
+            </a:r>
+          </a:p>
+          <a:p>
+            <a:endParaRPr lang="en-US" dirty="0"/>
+          </a:p>
+        </p:txBody>
+      </p:sp>
     </p:spTree>
     <p:extLst>
       <p:ext uri="{BB962C8B-B14F-4D97-AF65-F5344CB8AC3E}">
-        <p14:creationId xmlns:p14="http://schemas.microsoft.com/office/powerpoint/2010/main" val="1524103083"/>
+        <p14:creationId xmlns:p14="http://schemas.microsoft.com/office/powerpoint/2010/main" val="3397103311"/>
       </p:ext>
     </p:extLst>
   </p:cSld>
@@ -7056,7 +6985,7 @@
           <p:cNvPr id="2" name="Title 1">
             <a:extLst>
               <a:ext uri="{FF2B5EF4-FFF2-40B4-BE49-F238E27FC236}">
-                <a16:creationId xmlns:a16="http://schemas.microsoft.com/office/drawing/2014/main" id="{E0F3ADAD-4701-DD96-C758-CF08C6722303}"/>
+                <a16:creationId xmlns:a16="http://schemas.microsoft.com/office/drawing/2014/main" id="{72F79049-446A-6EBB-4477-31089B2552D4}"/>
               </a:ext>
             </a:extLst>
           </p:cNvPr>
@@ -7074,7 +7003,7 @@
           <a:p>
             <a:r>
               <a:rPr lang="en-US" dirty="0"/>
-              <a:t>Key Results</a:t>
+              <a:t>Discussion:</a:t>
             </a:r>
           </a:p>
         </p:txBody>
@@ -7084,7 +7013,7 @@
           <p:cNvPr id="3" name="Content Placeholder 2">
             <a:extLst>
               <a:ext uri="{FF2B5EF4-FFF2-40B4-BE49-F238E27FC236}">
-                <a16:creationId xmlns:a16="http://schemas.microsoft.com/office/drawing/2014/main" id="{1E5FF86C-D064-4938-5492-849FA44099E1}"/>
+                <a16:creationId xmlns:a16="http://schemas.microsoft.com/office/drawing/2014/main" id="{6A744435-417A-06B3-A245-2D1D46C5AAEF}"/>
               </a:ext>
             </a:extLst>
           </p:cNvPr>
@@ -7101,62 +7030,31 @@
           <a:lstStyle/>
           <a:p>
             <a:pPr>
-              <a:buFont typeface="+mj-lt"/>
-              <a:buAutoNum type="arabicPeriod"/>
+              <a:buFont typeface="Arial" panose="020B0604020202020204" pitchFamily="34" charset="0"/>
+              <a:buChar char="•"/>
             </a:pPr>
             <a:r>
-              <a:rPr lang="en-US" b="1" dirty="0"/>
-              <a:t>Predictors of Heart Failure:</a:t>
-            </a:r>
-            <a:endParaRPr lang="en-US" dirty="0"/>
-          </a:p>
-          <a:p>
-            <a:pPr marL="457200" lvl="1" indent="0">
+              <a:rPr lang="en-US" dirty="0"/>
+              <a:t> If generalized, results imply that focusing on key predictors like serum creatinine and ejection fraction can guide early detection and interventions.</a:t>
+            </a:r>
+          </a:p>
+          <a:p>
+            <a:pPr marL="0" indent="0">
               <a:buNone/>
             </a:pPr>
-            <a:r>
-              <a:rPr lang="en-US" dirty="0"/>
-              <a:t>Serum creatinine, ejection fraction, and follow-up time are critical.</a:t>
-            </a:r>
-          </a:p>
-          <a:p>
-            <a:pPr>
-              <a:buFont typeface="+mj-lt"/>
-              <a:buAutoNum type="arabicPeriod"/>
-            </a:pPr>
-            <a:r>
-              <a:rPr lang="en-US" b="1" dirty="0"/>
-              <a:t>Clustering Insights:</a:t>
-            </a:r>
-            <a:endParaRPr lang="en-US" dirty="0"/>
-          </a:p>
-          <a:p>
-            <a:pPr marL="457200" lvl="1" indent="0">
+            <a:endParaRPr lang="en-US" b="1" dirty="0"/>
+          </a:p>
+          <a:p>
+            <a:pPr marL="0" indent="0">
               <a:buNone/>
             </a:pPr>
             <a:r>
+              <a:rPr lang="en-US" b="1" dirty="0"/>
+              <a:t>Limitations: </a:t>
+            </a:r>
+            <a:r>
               <a:rPr lang="en-US" dirty="0"/>
-              <a:t>KMeans revealed distinct patient clusters, while DBSCAN identified outliers.</a:t>
-            </a:r>
-          </a:p>
-          <a:p>
-            <a:pPr>
-              <a:buFont typeface="+mj-lt"/>
-              <a:buAutoNum type="arabicPeriod"/>
-            </a:pPr>
-            <a:r>
-              <a:rPr lang="en-US" b="1" dirty="0"/>
-              <a:t>Visualization Highlights:</a:t>
-            </a:r>
-            <a:endParaRPr lang="en-US" dirty="0"/>
-          </a:p>
-          <a:p>
-            <a:pPr marL="457200" lvl="1" indent="0">
-              <a:buNone/>
-            </a:pPr>
-            <a:r>
-              <a:rPr lang="en-US" dirty="0"/>
-              <a:t>Age, smoking, and diabetes showed varying impacts on outcomes.</a:t>
+              <a:t>Confounding variables and dataset scope require further validation.</a:t>
             </a:r>
           </a:p>
           <a:p>
@@ -7167,7 +7065,7 @@
     </p:spTree>
     <p:extLst>
       <p:ext uri="{BB962C8B-B14F-4D97-AF65-F5344CB8AC3E}">
-        <p14:creationId xmlns:p14="http://schemas.microsoft.com/office/powerpoint/2010/main" val="3397103311"/>
+        <p14:creationId xmlns:p14="http://schemas.microsoft.com/office/powerpoint/2010/main" val="164866002"/>
       </p:ext>
     </p:extLst>
   </p:cSld>

</xml_diff>

<commit_message>
Final DS project - Group 10.pptx
</commit_message>
<xml_diff>
--- a/presentation/DS project - Group 10.pptx
+++ b/presentation/DS project - Group 10.pptx
@@ -713,82 +713,6 @@
                 <a:spcPts val="600"/>
               </a:spcBef>
             </a:pPr>
-            <a:r>
-              <a:rPr lang="en-US" b="0" i="0" dirty="0">
-                <a:solidFill>
-                  <a:srgbClr val="222222"/>
-                </a:solidFill>
-                <a:effectLst/>
-                <a:latin typeface="Arial" panose="020B0604020202020204" pitchFamily="34" charset="0"/>
-              </a:rPr>
-              <a:t>The introduction of the presentation outlines a project focused on analyzing Heart Failure Clinical Records to identify key predictors and trends that can improve patient management. The project targets an important medical challenge: understanding the factors contributing to heart failure outcomes and developing methods for early detection and targeted interventions.</a:t>
-            </a:r>
-            <a:br>
-              <a:rPr lang="en-US" b="0" i="0" dirty="0">
-                <a:solidFill>
-                  <a:srgbClr val="222222"/>
-                </a:solidFill>
-                <a:effectLst/>
-                <a:latin typeface="Arial" panose="020B0604020202020204" pitchFamily="34" charset="0"/>
-              </a:rPr>
-            </a:br>
-            <a:endParaRPr lang="en-US" b="0" i="0" dirty="0">
-              <a:solidFill>
-                <a:srgbClr val="222222"/>
-              </a:solidFill>
-              <a:effectLst/>
-              <a:latin typeface="Arial" panose="020B0604020202020204" pitchFamily="34" charset="0"/>
-            </a:endParaRPr>
-          </a:p>
-          <a:p>
-            <a:pPr algn="l" rtl="0">
-              <a:spcBef>
-                <a:spcPts val="600"/>
-              </a:spcBef>
-            </a:pPr>
-            <a:r>
-              <a:rPr lang="en-US" b="0" i="0" dirty="0">
-                <a:solidFill>
-                  <a:srgbClr val="222222"/>
-                </a:solidFill>
-                <a:effectLst/>
-                <a:latin typeface="Arial" panose="020B0604020202020204" pitchFamily="34" charset="0"/>
-              </a:rPr>
-              <a:t>Project Objective:</a:t>
-            </a:r>
-          </a:p>
-          <a:p>
-            <a:pPr algn="l" rtl="0">
-              <a:spcBef>
-                <a:spcPts val="600"/>
-              </a:spcBef>
-            </a:pPr>
-            <a:r>
-              <a:rPr lang="en-US" b="0" i="0" dirty="0">
-                <a:solidFill>
-                  <a:srgbClr val="222222"/>
-                </a:solidFill>
-                <a:effectLst/>
-                <a:latin typeface="Arial" panose="020B0604020202020204" pitchFamily="34" charset="0"/>
-              </a:rPr>
-              <a:t>The primary goal is to analyze clinical records of 299 heart failure patients to extract meaningful insights using visualization techniques, clustering methods, and feature analysis. By leveraging advanced data analysis tools, the study seeks to highlight significant predictors and trends that can guide healthcare practitioners in diagnosing and managing heart failure more effectively.</a:t>
-            </a:r>
-          </a:p>
-          <a:p>
-            <a:pPr algn="l" rtl="0">
-              <a:spcBef>
-                <a:spcPts val="600"/>
-              </a:spcBef>
-            </a:pPr>
-            <a:br>
-              <a:rPr lang="en-US" b="0" i="0" dirty="0">
-                <a:solidFill>
-                  <a:srgbClr val="222222"/>
-                </a:solidFill>
-                <a:effectLst/>
-                <a:latin typeface="Arial" panose="020B0604020202020204" pitchFamily="34" charset="0"/>
-              </a:rPr>
-            </a:br>
             <a:endParaRPr lang="en-US" b="0" i="0" dirty="0">
               <a:solidFill>
                 <a:srgbClr val="222222"/>
@@ -879,63 +803,6 @@
           <a:bodyPr/>
           <a:lstStyle/>
           <a:p>
-            <a:pPr algn="l" rtl="0">
-              <a:spcBef>
-                <a:spcPts val="600"/>
-              </a:spcBef>
-            </a:pPr>
-            <a:r>
-              <a:rPr lang="en-US" b="0" i="0" dirty="0">
-                <a:solidFill>
-                  <a:srgbClr val="222222"/>
-                </a:solidFill>
-                <a:effectLst/>
-                <a:latin typeface="Arial" panose="020B0604020202020204" pitchFamily="34" charset="0"/>
-              </a:rPr>
-              <a:t>Dataset:</a:t>
-            </a:r>
-          </a:p>
-          <a:p>
-            <a:pPr algn="l" rtl="0">
-              <a:spcBef>
-                <a:spcPts val="600"/>
-              </a:spcBef>
-            </a:pPr>
-            <a:r>
-              <a:rPr lang="en-US" b="0" i="0" dirty="0">
-                <a:solidFill>
-                  <a:srgbClr val="222222"/>
-                </a:solidFill>
-                <a:effectLst/>
-                <a:latin typeface="Arial" panose="020B0604020202020204" pitchFamily="34" charset="0"/>
-              </a:rPr>
-              <a:t>The dataset includes information from 299 patients, capturing 13 distinct features. These features range from clinical metrics, such as serum creatinine, ejection fraction, and time, to demographic and lifestyle factors like age, smoking habits, and medical history. The diverse nature of the dataset provides a comprehensive view of the variables affecting heart failure outcomes.</a:t>
-            </a:r>
-          </a:p>
-          <a:p>
-            <a:pPr algn="l" rtl="0">
-              <a:spcBef>
-                <a:spcPts val="600"/>
-              </a:spcBef>
-            </a:pPr>
-            <a:br>
-              <a:rPr lang="en-US" b="0" i="0" dirty="0">
-                <a:solidFill>
-                  <a:srgbClr val="222222"/>
-                </a:solidFill>
-                <a:effectLst/>
-                <a:latin typeface="Arial" panose="020B0604020202020204" pitchFamily="34" charset="0"/>
-              </a:rPr>
-            </a:br>
-            <a:endParaRPr lang="en-US" b="0" i="0" dirty="0">
-              <a:solidFill>
-                <a:srgbClr val="222222"/>
-              </a:solidFill>
-              <a:effectLst/>
-              <a:latin typeface="Arial" panose="020B0604020202020204" pitchFamily="34" charset="0"/>
-            </a:endParaRPr>
-          </a:p>
-          <a:p>
             <a:endParaRPr lang="en-US" dirty="0"/>
           </a:p>
         </p:txBody>
@@ -1025,236 +892,6 @@
                 <a:spcPts val="600"/>
               </a:spcBef>
             </a:pPr>
-            <a:r>
-              <a:rPr lang="en-US" b="0" i="0" dirty="0">
-                <a:solidFill>
-                  <a:srgbClr val="222222"/>
-                </a:solidFill>
-                <a:effectLst/>
-                <a:latin typeface="Arial" panose="020B0604020202020204" pitchFamily="34" charset="0"/>
-              </a:rPr>
-              <a:t>Methodology:</a:t>
-            </a:r>
-          </a:p>
-          <a:p>
-            <a:pPr algn="l" rtl="0">
-              <a:spcBef>
-                <a:spcPts val="600"/>
-              </a:spcBef>
-            </a:pPr>
-            <a:r>
-              <a:rPr lang="en-US" b="0" i="0" dirty="0">
-                <a:solidFill>
-                  <a:srgbClr val="222222"/>
-                </a:solidFill>
-                <a:effectLst/>
-                <a:latin typeface="Arial" panose="020B0604020202020204" pitchFamily="34" charset="0"/>
-              </a:rPr>
-              <a:t>The project employs a multi-step analytical approach:</a:t>
-            </a:r>
-          </a:p>
-          <a:p>
-            <a:pPr algn="l" rtl="0">
-              <a:spcBef>
-                <a:spcPts val="600"/>
-              </a:spcBef>
-            </a:pPr>
-            <a:br>
-              <a:rPr lang="en-US" b="0" i="0" dirty="0">
-                <a:solidFill>
-                  <a:srgbClr val="222222"/>
-                </a:solidFill>
-                <a:effectLst/>
-                <a:latin typeface="Arial" panose="020B0604020202020204" pitchFamily="34" charset="0"/>
-              </a:rPr>
-            </a:br>
-            <a:endParaRPr lang="en-US" b="0" i="0" dirty="0">
-              <a:solidFill>
-                <a:srgbClr val="222222"/>
-              </a:solidFill>
-              <a:effectLst/>
-              <a:latin typeface="Arial" panose="020B0604020202020204" pitchFamily="34" charset="0"/>
-            </a:endParaRPr>
-          </a:p>
-          <a:p>
-            <a:pPr algn="l" rtl="0">
-              <a:spcBef>
-                <a:spcPts val="600"/>
-              </a:spcBef>
-            </a:pPr>
-            <a:r>
-              <a:rPr lang="en-US" b="0" i="0" dirty="0">
-                <a:solidFill>
-                  <a:srgbClr val="222222"/>
-                </a:solidFill>
-                <a:effectLst/>
-                <a:latin typeface="Arial" panose="020B0604020202020204" pitchFamily="34" charset="0"/>
-              </a:rPr>
-              <a:t>Exploratory Data Analysis (EDA): Visualization techniques, including scatter plots, pie charts, line plots, bar plots, and heatmaps, are used to explore feature distributions and relationships. This step helps in identifying significant trends and correlations within the data.</a:t>
-            </a:r>
-          </a:p>
-          <a:p>
-            <a:pPr algn="l" rtl="0">
-              <a:spcBef>
-                <a:spcPts val="600"/>
-              </a:spcBef>
-            </a:pPr>
-            <a:br>
-              <a:rPr lang="en-US" b="0" i="0" dirty="0">
-                <a:solidFill>
-                  <a:srgbClr val="222222"/>
-                </a:solidFill>
-                <a:effectLst/>
-                <a:latin typeface="Arial" panose="020B0604020202020204" pitchFamily="34" charset="0"/>
-              </a:rPr>
-            </a:br>
-            <a:endParaRPr lang="en-US" b="0" i="0" dirty="0">
-              <a:solidFill>
-                <a:srgbClr val="222222"/>
-              </a:solidFill>
-              <a:effectLst/>
-              <a:latin typeface="Arial" panose="020B0604020202020204" pitchFamily="34" charset="0"/>
-            </a:endParaRPr>
-          </a:p>
-          <a:p>
-            <a:pPr algn="l" rtl="0">
-              <a:spcBef>
-                <a:spcPts val="600"/>
-              </a:spcBef>
-            </a:pPr>
-            <a:r>
-              <a:rPr lang="en-US" b="0" i="0" dirty="0">
-                <a:solidFill>
-                  <a:srgbClr val="222222"/>
-                </a:solidFill>
-                <a:effectLst/>
-                <a:latin typeface="Arial" panose="020B0604020202020204" pitchFamily="34" charset="0"/>
-              </a:rPr>
-              <a:t>Clustering Algorithms:</a:t>
-            </a:r>
-          </a:p>
-          <a:p>
-            <a:pPr algn="l" rtl="0">
-              <a:spcBef>
-                <a:spcPts val="600"/>
-              </a:spcBef>
-            </a:pPr>
-            <a:br>
-              <a:rPr lang="en-US" b="0" i="0" dirty="0">
-                <a:solidFill>
-                  <a:srgbClr val="222222"/>
-                </a:solidFill>
-                <a:effectLst/>
-                <a:latin typeface="Arial" panose="020B0604020202020204" pitchFamily="34" charset="0"/>
-              </a:rPr>
-            </a:br>
-            <a:endParaRPr lang="en-US" b="0" i="0" dirty="0">
-              <a:solidFill>
-                <a:srgbClr val="222222"/>
-              </a:solidFill>
-              <a:effectLst/>
-              <a:latin typeface="Arial" panose="020B0604020202020204" pitchFamily="34" charset="0"/>
-            </a:endParaRPr>
-          </a:p>
-          <a:p>
-            <a:pPr algn="l" rtl="0">
-              <a:spcBef>
-                <a:spcPts val="600"/>
-              </a:spcBef>
-            </a:pPr>
-            <a:r>
-              <a:rPr lang="en-US" b="0" i="0" dirty="0">
-                <a:solidFill>
-                  <a:srgbClr val="222222"/>
-                </a:solidFill>
-                <a:effectLst/>
-                <a:latin typeface="Arial" panose="020B0604020202020204" pitchFamily="34" charset="0"/>
-              </a:rPr>
-              <a:t>K-means clustering: Used to segment patients into groups based on similar characteristics.</a:t>
-            </a:r>
-          </a:p>
-          <a:p>
-            <a:pPr algn="l" rtl="0">
-              <a:spcBef>
-                <a:spcPts val="600"/>
-              </a:spcBef>
-            </a:pPr>
-            <a:r>
-              <a:rPr lang="en-US" b="0" i="0" dirty="0">
-                <a:solidFill>
-                  <a:srgbClr val="222222"/>
-                </a:solidFill>
-                <a:effectLst/>
-                <a:latin typeface="Arial" panose="020B0604020202020204" pitchFamily="34" charset="0"/>
-              </a:rPr>
-              <a:t>Agglomerative clustering and DBSCAN: Applied to identify outliers and unique cases that might deviate from common patterns.</a:t>
-            </a:r>
-          </a:p>
-          <a:p>
-            <a:pPr algn="l" rtl="0">
-              <a:spcBef>
-                <a:spcPts val="600"/>
-              </a:spcBef>
-            </a:pPr>
-            <a:r>
-              <a:rPr lang="en-US" b="0" i="0" dirty="0">
-                <a:solidFill>
-                  <a:srgbClr val="222222"/>
-                </a:solidFill>
-                <a:effectLst/>
-                <a:latin typeface="Arial" panose="020B0604020202020204" pitchFamily="34" charset="0"/>
-              </a:rPr>
-              <a:t>Regression Analysis:</a:t>
-            </a:r>
-          </a:p>
-          <a:p>
-            <a:pPr algn="l" rtl="0">
-              <a:spcBef>
-                <a:spcPts val="600"/>
-              </a:spcBef>
-            </a:pPr>
-            <a:br>
-              <a:rPr lang="en-US" b="0" i="0" dirty="0">
-                <a:solidFill>
-                  <a:srgbClr val="222222"/>
-                </a:solidFill>
-                <a:effectLst/>
-                <a:latin typeface="Arial" panose="020B0604020202020204" pitchFamily="34" charset="0"/>
-              </a:rPr>
-            </a:br>
-            <a:endParaRPr lang="en-US" b="0" i="0" dirty="0">
-              <a:solidFill>
-                <a:srgbClr val="222222"/>
-              </a:solidFill>
-              <a:effectLst/>
-              <a:latin typeface="Arial" panose="020B0604020202020204" pitchFamily="34" charset="0"/>
-            </a:endParaRPr>
-          </a:p>
-          <a:p>
-            <a:pPr algn="l" rtl="0">
-              <a:spcBef>
-                <a:spcPts val="600"/>
-              </a:spcBef>
-            </a:pPr>
-            <a:r>
-              <a:rPr lang="en-US" b="0" i="0" dirty="0">
-                <a:solidFill>
-                  <a:srgbClr val="222222"/>
-                </a:solidFill>
-                <a:effectLst/>
-                <a:latin typeface="Arial" panose="020B0604020202020204" pitchFamily="34" charset="0"/>
-              </a:rPr>
-              <a:t>Several regression models (OLS, Linear, Lasso, Ridge, ElasticNet) are tested using 5-fold cross-validation to predict outcomes and identify the most impactful features. These models help in quantifying the importance of variables and their contributions to patient outcomes.</a:t>
-            </a:r>
-            <a:br>
-              <a:rPr lang="en-US" b="0" i="0" dirty="0">
-                <a:solidFill>
-                  <a:srgbClr val="222222"/>
-                </a:solidFill>
-                <a:effectLst/>
-                <a:latin typeface="Arial" panose="020B0604020202020204" pitchFamily="34" charset="0"/>
-              </a:rPr>
-            </a:br>
             <a:endParaRPr lang="en-US" b="0" i="0" dirty="0">
               <a:solidFill>
                 <a:srgbClr val="222222"/>
@@ -1346,236 +983,7 @@
           <a:lstStyle/>
           <a:p>
             <a:pPr algn="l"/>
-            <a:r>
-              <a:rPr lang="en-US" b="0" i="0" dirty="0">
-                <a:solidFill>
-                  <a:srgbClr val="222222"/>
-                </a:solidFill>
-                <a:effectLst/>
-                <a:latin typeface="Arial" panose="020B0604020202020204" pitchFamily="34" charset="0"/>
-              </a:rPr>
-              <a:t>Clusters: Represent groups of patients with similar clinical profiles. Grouping Logic: Patients are grouped by similarity in scaled feature values.</a:t>
-            </a:r>
-          </a:p>
-          <a:p>
-            <a:pPr algn="l"/>
-            <a:r>
-              <a:rPr lang="en-US" b="0" i="0" dirty="0">
-                <a:solidFill>
-                  <a:srgbClr val="222222"/>
-                </a:solidFill>
-                <a:effectLst/>
-                <a:latin typeface="Arial" panose="020B0604020202020204" pitchFamily="34" charset="0"/>
-              </a:rPr>
-              <a:t>PCA's Role: Simplified the data to 2D, enabling efficient clustering while retaining meaningful variance.</a:t>
-            </a:r>
-          </a:p>
-          <a:p>
-            <a:r>
-              <a:rPr lang="en-US" b="0" i="0" dirty="0">
-                <a:solidFill>
-                  <a:srgbClr val="222222"/>
-                </a:solidFill>
-                <a:effectLst/>
-                <a:latin typeface="Arial" panose="020B0604020202020204" pitchFamily="34" charset="0"/>
-              </a:rPr>
-              <a:t>add this notes in clustering</a:t>
-            </a:r>
-            <a:br>
-              <a:rPr lang="en-US" b="0" i="0" dirty="0">
-                <a:solidFill>
-                  <a:srgbClr val="222222"/>
-                </a:solidFill>
-                <a:effectLst/>
-                <a:latin typeface="Arial" panose="020B0604020202020204" pitchFamily="34" charset="0"/>
-              </a:rPr>
-            </a:br>
-            <a:br>
-              <a:rPr lang="en-US" b="0" i="0" dirty="0">
-                <a:solidFill>
-                  <a:srgbClr val="222222"/>
-                </a:solidFill>
-                <a:effectLst/>
-                <a:latin typeface="Arial" panose="020B0604020202020204" pitchFamily="34" charset="0"/>
-              </a:rPr>
-            </a:br>
-            <a:r>
-              <a:rPr lang="en-US" b="0" i="0" dirty="0">
-                <a:solidFill>
-                  <a:srgbClr val="222222"/>
-                </a:solidFill>
-                <a:effectLst/>
-                <a:latin typeface="Arial" panose="020B0604020202020204" pitchFamily="34" charset="0"/>
-              </a:rPr>
-              <a:t>Clustering techniques like KMeans, Agglomerative Clustering, and DBSCAN grouped patients based on clinical, demographic, and lifestyle features, while PCA was likely used to reduce dimensionality and enhance clustering efficiency and visualization .</a:t>
-            </a:r>
-            <a:br>
-              <a:rPr lang="en-US" b="0" i="0" dirty="0">
-                <a:solidFill>
-                  <a:srgbClr val="222222"/>
-                </a:solidFill>
-                <a:effectLst/>
-                <a:latin typeface="Arial" panose="020B0604020202020204" pitchFamily="34" charset="0"/>
-              </a:rPr>
-            </a:br>
-            <a:br>
-              <a:rPr lang="en-US" b="0" i="0" dirty="0">
-                <a:solidFill>
-                  <a:srgbClr val="222222"/>
-                </a:solidFill>
-                <a:effectLst/>
-                <a:latin typeface="Arial" panose="020B0604020202020204" pitchFamily="34" charset="0"/>
-              </a:rPr>
-            </a:br>
-            <a:r>
-              <a:rPr lang="en-US" dirty="0"/>
-              <a:t>The two graphs represent clustering results after applying normalization and PCA (Principal Component Analysis):</a:t>
-            </a:r>
-          </a:p>
-          <a:p>
             <a:endParaRPr lang="en-US" dirty="0"/>
-          </a:p>
-          <a:p>
-            <a:pPr>
-              <a:buFont typeface="+mj-lt"/>
-              <a:buAutoNum type="arabicPeriod"/>
-            </a:pPr>
-            <a:r>
-              <a:rPr lang="en-US" b="1" dirty="0"/>
-              <a:t>DBSCAN (Density-Based Spatial Clustering of Applications with Noise)</a:t>
-            </a:r>
-            <a:r>
-              <a:rPr lang="en-US" dirty="0"/>
-              <a:t>:</a:t>
-            </a:r>
-          </a:p>
-          <a:p>
-            <a:pPr marL="742950" lvl="1" indent="-285750">
-              <a:buFont typeface="+mj-lt"/>
-              <a:buAutoNum type="arabicPeriod"/>
-            </a:pPr>
-            <a:r>
-              <a:rPr lang="en-US" dirty="0"/>
-              <a:t>Points are mostly clustered together, with some spread indicating potential noise or outliers.</a:t>
-            </a:r>
-          </a:p>
-          <a:p>
-            <a:pPr marL="742950" lvl="1" indent="-285750">
-              <a:buFont typeface="+mj-lt"/>
-              <a:buAutoNum type="arabicPeriod"/>
-            </a:pPr>
-            <a:r>
-              <a:rPr lang="en-US" dirty="0"/>
-              <a:t>DBSCAN is effective in identifying outliers but struggles to form distinct clusters in this case due to the lack of clear density-based separations.</a:t>
-            </a:r>
-          </a:p>
-          <a:p>
-            <a:pPr marL="742950" lvl="1" indent="-285750">
-              <a:buFont typeface="+mj-lt"/>
-              <a:buAutoNum type="arabicPeriod"/>
-            </a:pPr>
-            <a:endParaRPr lang="en-US" dirty="0"/>
-          </a:p>
-          <a:p>
-            <a:pPr>
-              <a:buFont typeface="+mj-lt"/>
-              <a:buAutoNum type="arabicPeriod"/>
-            </a:pPr>
-            <a:r>
-              <a:rPr lang="en-US" b="1" dirty="0"/>
-              <a:t>KMeans Clustering</a:t>
-            </a:r>
-            <a:r>
-              <a:rPr lang="en-US" dirty="0"/>
-              <a:t>:</a:t>
-            </a:r>
-          </a:p>
-          <a:p>
-            <a:pPr marL="742950" lvl="1" indent="-285750">
-              <a:buFont typeface="+mj-lt"/>
-              <a:buAutoNum type="arabicPeriod"/>
-            </a:pPr>
-            <a:r>
-              <a:rPr lang="en-US" dirty="0"/>
-              <a:t>Points are segmented into distinct clusters (denoted by different colors: teal, purple, and yellow).</a:t>
-            </a:r>
-          </a:p>
-          <a:p>
-            <a:pPr marL="742950" lvl="1" indent="-285750">
-              <a:buFont typeface="+mj-lt"/>
-              <a:buAutoNum type="arabicPeriod"/>
-            </a:pPr>
-            <a:r>
-              <a:rPr lang="en-US" dirty="0"/>
-              <a:t>KMeans clearly identifies three groups, making it more effective for partitioning data into meaningful segments.</a:t>
-            </a:r>
-          </a:p>
-          <a:p>
-            <a:pPr marL="742950" lvl="1" indent="-285750">
-              <a:buFont typeface="+mj-lt"/>
-              <a:buAutoNum type="arabicPeriod"/>
-            </a:pPr>
-            <a:endParaRPr lang="en-US" dirty="0"/>
-          </a:p>
-          <a:p>
-            <a:r>
-              <a:rPr lang="en-US" b="1" dirty="0"/>
-              <a:t>Comparison and Recommendation:</a:t>
-            </a:r>
-          </a:p>
-          <a:p>
-            <a:pPr>
-              <a:buFont typeface="Arial" panose="020B0604020202020204" pitchFamily="34" charset="0"/>
-              <a:buChar char="•"/>
-            </a:pPr>
-            <a:r>
-              <a:rPr lang="en-US" b="1" dirty="0"/>
-              <a:t>DBSCAN</a:t>
-            </a:r>
-            <a:r>
-              <a:rPr lang="en-US" dirty="0"/>
-              <a:t>: Better for outlier detection but less effective at segmenting this dataset into meaningful clusters.</a:t>
-            </a:r>
-          </a:p>
-          <a:p>
-            <a:pPr>
-              <a:buFont typeface="Arial" panose="020B0604020202020204" pitchFamily="34" charset="0"/>
-              <a:buChar char="•"/>
-            </a:pPr>
-            <a:r>
-              <a:rPr lang="en-US" b="1" dirty="0"/>
-              <a:t>KMeans</a:t>
-            </a:r>
-            <a:r>
-              <a:rPr lang="en-US" dirty="0"/>
-              <a:t>: Performs better here, with well-defined clusters, indicating clearer insights into groupings.</a:t>
-            </a:r>
-            <a:br>
-              <a:rPr lang="en-US" b="0" i="0" dirty="0">
-                <a:solidFill>
-                  <a:srgbClr val="222222"/>
-                </a:solidFill>
-                <a:effectLst/>
-                <a:latin typeface="Arial" panose="020B0604020202020204" pitchFamily="34" charset="0"/>
-              </a:rPr>
-            </a:br>
-            <a:br>
-              <a:rPr lang="en-US" b="0" i="0" dirty="0">
-                <a:solidFill>
-                  <a:srgbClr val="222222"/>
-                </a:solidFill>
-                <a:effectLst/>
-                <a:latin typeface="Arial" panose="020B0604020202020204" pitchFamily="34" charset="0"/>
-              </a:rPr>
-            </a:br>
-            <a:r>
-              <a:rPr lang="en-US" b="1" dirty="0"/>
-              <a:t>Conclusion</a:t>
-            </a:r>
-            <a:r>
-              <a:rPr lang="en-US" dirty="0"/>
-              <a:t>: KMeans is the better clustering method for this dataset, as it creates more interpretable and distinct clusters compared to DBSCAN.</a:t>
-            </a:r>
           </a:p>
         </p:txBody>
       </p:sp>
@@ -1659,82 +1067,6 @@
           <a:bodyPr/>
           <a:lstStyle/>
           <a:p>
-            <a:r>
-              <a:rPr lang="en-US" dirty="0"/>
-              <a:t>Based on the RMSE (Root Mean Square Error) graph:</a:t>
-            </a:r>
-          </a:p>
-          <a:p>
-            <a:pPr>
-              <a:buFont typeface="Arial" panose="020B0604020202020204" pitchFamily="34" charset="0"/>
-              <a:buChar char="•"/>
-            </a:pPr>
-            <a:r>
-              <a:rPr lang="en-US" b="1" dirty="0"/>
-              <a:t>Best Performing Model</a:t>
-            </a:r>
-            <a:r>
-              <a:rPr lang="en-US" dirty="0"/>
-              <a:t>: ElasticNet Regression has the lowest RMSE across most datasets, especially in the </a:t>
-            </a:r>
-            <a:r>
-              <a:rPr lang="en-US" b="1" dirty="0"/>
-              <a:t>Biochemical Dataset</a:t>
-            </a:r>
-            <a:r>
-              <a:rPr lang="en-US" dirty="0"/>
-              <a:t>, indicating better accuracy.</a:t>
-            </a:r>
-          </a:p>
-          <a:p>
-            <a:pPr>
-              <a:buFont typeface="Arial" panose="020B0604020202020204" pitchFamily="34" charset="0"/>
-              <a:buChar char="•"/>
-            </a:pPr>
-            <a:r>
-              <a:rPr lang="en-US" b="1" dirty="0"/>
-              <a:t>Second Best</a:t>
-            </a:r>
-            <a:r>
-              <a:rPr lang="en-US" dirty="0"/>
-              <a:t>: Ridge Regression closely follows ElasticNet with comparable RMSE, making it a good alternative.</a:t>
-            </a:r>
-          </a:p>
-          <a:p>
-            <a:pPr>
-              <a:buFont typeface="Arial" panose="020B0604020202020204" pitchFamily="34" charset="0"/>
-              <a:buChar char="•"/>
-            </a:pPr>
-            <a:r>
-              <a:rPr lang="en-US" b="1" dirty="0"/>
-              <a:t>Least Effective</a:t>
-            </a:r>
-            <a:r>
-              <a:rPr lang="en-US" dirty="0"/>
-              <a:t>: Lasso Regression consistently shows higher RMSE compared to other models, particularly on the </a:t>
-            </a:r>
-            <a:r>
-              <a:rPr lang="en-US" b="1" dirty="0"/>
-              <a:t>Lifestyle Dataset</a:t>
-            </a:r>
-            <a:r>
-              <a:rPr lang="en-US" dirty="0"/>
-              <a:t>.</a:t>
-            </a:r>
-          </a:p>
-          <a:p>
-            <a:r>
-              <a:rPr lang="en-US" b="1" dirty="0"/>
-              <a:t>Conclusion:</a:t>
-            </a:r>
-          </a:p>
-          <a:p>
-            <a:r>
-              <a:rPr lang="en-US" dirty="0"/>
-              <a:t>ElasticNet Regression is the best model for this analysis due to its overall lower RMSE, indicating better predictive performance.</a:t>
-            </a:r>
-          </a:p>
-          <a:p>
             <a:endParaRPr lang="en-US" dirty="0"/>
           </a:p>
         </p:txBody>
@@ -1819,60 +1151,6 @@
           <a:bodyPr/>
           <a:lstStyle/>
           <a:p>
-            <a:r>
-              <a:rPr lang="en-US" dirty="0"/>
-              <a:t>The heatmap shows the following key correlations:</a:t>
-            </a:r>
-          </a:p>
-          <a:p>
-            <a:pPr>
-              <a:buFont typeface="Arial" panose="020B0604020202020204" pitchFamily="34" charset="0"/>
-              <a:buChar char="•"/>
-            </a:pPr>
-            <a:r>
-              <a:rPr lang="en-US" b="1" dirty="0"/>
-              <a:t>Strong Positive</a:t>
-            </a:r>
-            <a:r>
-              <a:rPr lang="en-US" dirty="0"/>
-              <a:t>: Serum creatinine with death events (0.29) and sex with smoking (0.45).</a:t>
-            </a:r>
-          </a:p>
-          <a:p>
-            <a:pPr>
-              <a:buFont typeface="Arial" panose="020B0604020202020204" pitchFamily="34" charset="0"/>
-              <a:buChar char="•"/>
-            </a:pPr>
-            <a:r>
-              <a:rPr lang="en-US" b="1" dirty="0"/>
-              <a:t>Strong Negative</a:t>
-            </a:r>
-            <a:r>
-              <a:rPr lang="en-US" dirty="0"/>
-              <a:t>: Time with death events (-0.53) and ejection fraction with death events (-0.27).</a:t>
-            </a:r>
-          </a:p>
-          <a:p>
-            <a:pPr>
-              <a:buFont typeface="Arial" panose="020B0604020202020204" pitchFamily="34" charset="0"/>
-              <a:buChar char="•"/>
-            </a:pPr>
-            <a:r>
-              <a:rPr lang="en-US" b="1" dirty="0"/>
-              <a:t>Other Notable</a:t>
-            </a:r>
-            <a:r>
-              <a:rPr lang="en-US" dirty="0"/>
-              <a:t>: Age weakly correlates with death events (0.25), while serum sodium shows a weak negative correlation (-0.20).</a:t>
-            </a:r>
-          </a:p>
-          <a:p>
-            <a:r>
-              <a:rPr lang="en-US" dirty="0"/>
-              <a:t>These insights highlight critical features influencing heart failure outcomes.</a:t>
-            </a:r>
-          </a:p>
-          <a:p>
             <a:endParaRPr lang="en-US" dirty="0"/>
           </a:p>
         </p:txBody>
@@ -1957,129 +1235,89 @@
           <a:bodyPr/>
           <a:lstStyle/>
           <a:p>
-            <a:r>
-              <a:rPr lang="en-US" dirty="0"/>
-              <a:t>This graph compares feature importance (coefficient magnitudes) across Linear, Lasso, Ridge, and ElasticNet regression models. Here's the explanation:</a:t>
-            </a:r>
-          </a:p>
-          <a:p>
-            <a:pPr>
-              <a:buFont typeface="+mj-lt"/>
-              <a:buAutoNum type="arabicPeriod"/>
-            </a:pPr>
-            <a:r>
-              <a:rPr lang="en-US" b="1" dirty="0"/>
-              <a:t>Most Important Features</a:t>
-            </a:r>
-            <a:r>
-              <a:rPr lang="en-US" dirty="0"/>
-              <a:t>:</a:t>
-            </a:r>
-          </a:p>
-          <a:p>
-            <a:pPr marL="742950" lvl="1" indent="-285750">
-              <a:buFont typeface="+mj-lt"/>
-              <a:buAutoNum type="arabicPeriod"/>
-            </a:pPr>
-            <a:r>
-              <a:rPr lang="en-US" b="1" dirty="0"/>
-              <a:t>Serum Creatinine</a:t>
-            </a:r>
-            <a:r>
-              <a:rPr lang="en-US" dirty="0"/>
-              <a:t>: Highest importance across all models, especially for Linear Regression, indicating it is the strongest predictor of outcomes.</a:t>
-            </a:r>
-          </a:p>
-          <a:p>
-            <a:pPr marL="742950" lvl="1" indent="-285750">
-              <a:buFont typeface="+mj-lt"/>
-              <a:buAutoNum type="arabicPeriod"/>
-            </a:pPr>
-            <a:r>
-              <a:rPr lang="en-US" b="1" dirty="0"/>
-              <a:t>Ejection Fraction and Time</a:t>
-            </a:r>
-            <a:r>
-              <a:rPr lang="en-US" dirty="0"/>
-              <a:t>: Consistently important across all models, reinforcing their critical role in predicting heart failure.</a:t>
-            </a:r>
-          </a:p>
-          <a:p>
-            <a:pPr>
-              <a:buFont typeface="+mj-lt"/>
-              <a:buAutoNum type="arabicPeriod"/>
-            </a:pPr>
-            <a:r>
-              <a:rPr lang="en-US" b="1" dirty="0"/>
-              <a:t>Moderate Importance</a:t>
-            </a:r>
-            <a:r>
-              <a:rPr lang="en-US" dirty="0"/>
-              <a:t>:</a:t>
-            </a:r>
-          </a:p>
-          <a:p>
-            <a:pPr marL="742950" lvl="1" indent="-285750">
-              <a:buFont typeface="+mj-lt"/>
-              <a:buAutoNum type="arabicPeriod"/>
-            </a:pPr>
-            <a:r>
-              <a:rPr lang="en-US" b="1" dirty="0"/>
-              <a:t>Sex and Serum Sodium</a:t>
-            </a:r>
-            <a:r>
-              <a:rPr lang="en-US" dirty="0"/>
-              <a:t>: Show moderate contribution in all models but less impactful than serum creatinine and ejection fraction.</a:t>
-            </a:r>
-          </a:p>
-          <a:p>
-            <a:pPr>
-              <a:buFont typeface="+mj-lt"/>
-              <a:buAutoNum type="arabicPeriod"/>
-            </a:pPr>
-            <a:r>
-              <a:rPr lang="en-US" b="1" dirty="0"/>
-              <a:t>Least Important Features</a:t>
-            </a:r>
-            <a:r>
-              <a:rPr lang="en-US" dirty="0"/>
-              <a:t>:</a:t>
-            </a:r>
-          </a:p>
-          <a:p>
-            <a:pPr marL="742950" lvl="1" indent="-285750">
-              <a:buFont typeface="+mj-lt"/>
-              <a:buAutoNum type="arabicPeriod"/>
-            </a:pPr>
-            <a:r>
-              <a:rPr lang="en-US" b="1" dirty="0"/>
-              <a:t>Creatinine Phosphokinase, Platelets, </a:t>
-            </a:r>
-            <a:r>
-              <a:rPr lang="en-US" b="1" dirty="0" err="1"/>
-              <a:t>Anaemia</a:t>
-            </a:r>
-            <a:r>
-              <a:rPr lang="en-US" b="1" dirty="0"/>
-              <a:t>, and Smoking</a:t>
-            </a:r>
-            <a:r>
-              <a:rPr lang="en-US" dirty="0"/>
-              <a:t>: Low importance across all models, suggesting limited predictive value for heart failure in this dataset.</a:t>
-            </a:r>
-          </a:p>
-          <a:p>
-            <a:r>
-              <a:rPr lang="en-US" b="1" dirty="0"/>
-              <a:t>Key Takeaway:</a:t>
-            </a:r>
-          </a:p>
-          <a:p>
-            <a:r>
-              <a:rPr lang="en-US" dirty="0"/>
-              <a:t>Serum creatinine, ejection fraction, and time are the most critical features across all regression methods, while others play smaller roles. This consistency across models validates their importance for predicting heart failure outcomes.</a:t>
-            </a:r>
-          </a:p>
+            <a:endParaRPr lang="en-US" dirty="0"/>
+          </a:p>
+        </p:txBody>
+      </p:sp>
+      <p:sp>
+        <p:nvSpPr>
+          <p:cNvPr id="4" name="Slide Number Placeholder 3"/>
+          <p:cNvSpPr>
+            <a:spLocks noGrp="1"/>
+          </p:cNvSpPr>
+          <p:nvPr>
+            <p:ph type="sldNum" sz="quarter" idx="5"/>
+          </p:nvPr>
+        </p:nvSpPr>
+        <p:spPr/>
+        <p:txBody>
+          <a:bodyPr/>
+          <a:lstStyle/>
+          <a:p>
+            <a:fld id="{CC709C84-9087-EE45-A947-8DEA084ED9CA}" type="slidenum">
+              <a:rPr lang="en-US" smtClean="0"/>
+              <a:t>8</a:t>
+            </a:fld>
+            <a:endParaRPr lang="en-US"/>
+          </a:p>
+        </p:txBody>
+      </p:sp>
+    </p:spTree>
+    <p:extLst>
+      <p:ext uri="{BB962C8B-B14F-4D97-AF65-F5344CB8AC3E}">
+        <p14:creationId xmlns:p14="http://schemas.microsoft.com/office/powerpoint/2010/main" val="2961957070"/>
+      </p:ext>
+    </p:extLst>
+  </p:cSld>
+  <p:clrMapOvr>
+    <a:masterClrMapping/>
+  </p:clrMapOvr>
+</p:notes>
+</file>
+
+<file path=ppt/notesSlides/notesSlide8.xml><?xml version="1.0" encoding="utf-8"?>
+<p:notes xmlns:a="http://schemas.openxmlformats.org/drawingml/2006/main" xmlns:r="http://schemas.openxmlformats.org/officeDocument/2006/relationships" xmlns:p="http://schemas.openxmlformats.org/presentationml/2006/main">
+  <p:cSld>
+    <p:spTree>
+      <p:nvGrpSpPr>
+        <p:cNvPr id="1" name=""/>
+        <p:cNvGrpSpPr/>
+        <p:nvPr/>
+      </p:nvGrpSpPr>
+      <p:grpSpPr>
+        <a:xfrm>
+          <a:off x="0" y="0"/>
+          <a:ext cx="0" cy="0"/>
+          <a:chOff x="0" y="0"/>
+          <a:chExt cx="0" cy="0"/>
+        </a:xfrm>
+      </p:grpSpPr>
+      <p:sp>
+        <p:nvSpPr>
+          <p:cNvPr id="2" name="Slide Image Placeholder 1"/>
+          <p:cNvSpPr>
+            <a:spLocks noGrp="1" noRot="1" noChangeAspect="1"/>
+          </p:cNvSpPr>
+          <p:nvPr>
+            <p:ph type="sldImg"/>
+          </p:nvPr>
+        </p:nvSpPr>
+        <p:spPr/>
+      </p:sp>
+      <p:sp>
+        <p:nvSpPr>
+          <p:cNvPr id="3" name="Notes Placeholder 2"/>
+          <p:cNvSpPr>
+            <a:spLocks noGrp="1"/>
+          </p:cNvSpPr>
+          <p:nvPr>
+            <p:ph type="body" idx="1"/>
+          </p:nvPr>
+        </p:nvSpPr>
+        <p:spPr/>
+        <p:txBody>
+          <a:bodyPr/>
+          <a:lstStyle/>
           <a:p>
             <a:endParaRPr lang="en-US" dirty="0"/>
           </a:p>
@@ -6531,7 +5769,7 @@
         <p:spPr bwMode="auto">
           <a:xfrm>
             <a:off x="788353" y="1958557"/>
-            <a:ext cx="5067015" cy="4022725"/>
+            <a:ext cx="5067013" cy="4022725"/>
           </a:xfrm>
           <a:prstGeom prst="rect">
             <a:avLst/>
@@ -6578,7 +5816,7 @@
         <p:spPr bwMode="auto">
           <a:xfrm>
             <a:off x="6336634" y="1958557"/>
-            <a:ext cx="5197640" cy="4077063"/>
+            <a:ext cx="5067013" cy="4022725"/>
           </a:xfrm>
           <a:prstGeom prst="rect">
             <a:avLst/>

</xml_diff>